<commit_message>
fixed wording not alligned
</commit_message>
<xml_diff>
--- a/figures/bldg_data_structure.pptx
+++ b/figures/bldg_data_structure.pptx
@@ -259,7 +259,7 @@
           <a:p>
             <a:fld id="{1A30122B-BC72-41F7-938E-33D4221D7AF9}" type="datetimeFigureOut">
               <a:rPr lang="en-US" smtClean="0"/>
-              <a:t>6/16/2025</a:t>
+              <a:t>6/20/25</a:t>
             </a:fld>
             <a:endParaRPr lang="en-US"/>
           </a:p>
@@ -457,7 +457,7 @@
           <a:p>
             <a:fld id="{1A30122B-BC72-41F7-938E-33D4221D7AF9}" type="datetimeFigureOut">
               <a:rPr lang="en-US" smtClean="0"/>
-              <a:t>6/16/2025</a:t>
+              <a:t>6/20/25</a:t>
             </a:fld>
             <a:endParaRPr lang="en-US"/>
           </a:p>
@@ -665,7 +665,7 @@
           <a:p>
             <a:fld id="{1A30122B-BC72-41F7-938E-33D4221D7AF9}" type="datetimeFigureOut">
               <a:rPr lang="en-US" smtClean="0"/>
-              <a:t>6/16/2025</a:t>
+              <a:t>6/20/25</a:t>
             </a:fld>
             <a:endParaRPr lang="en-US"/>
           </a:p>
@@ -863,7 +863,7 @@
           <a:p>
             <a:fld id="{1A30122B-BC72-41F7-938E-33D4221D7AF9}" type="datetimeFigureOut">
               <a:rPr lang="en-US" smtClean="0"/>
-              <a:t>6/16/2025</a:t>
+              <a:t>6/20/25</a:t>
             </a:fld>
             <a:endParaRPr lang="en-US"/>
           </a:p>
@@ -1138,7 +1138,7 @@
           <a:p>
             <a:fld id="{1A30122B-BC72-41F7-938E-33D4221D7AF9}" type="datetimeFigureOut">
               <a:rPr lang="en-US" smtClean="0"/>
-              <a:t>6/16/2025</a:t>
+              <a:t>6/20/25</a:t>
             </a:fld>
             <a:endParaRPr lang="en-US"/>
           </a:p>
@@ -1403,7 +1403,7 @@
           <a:p>
             <a:fld id="{1A30122B-BC72-41F7-938E-33D4221D7AF9}" type="datetimeFigureOut">
               <a:rPr lang="en-US" smtClean="0"/>
-              <a:t>6/16/2025</a:t>
+              <a:t>6/20/25</a:t>
             </a:fld>
             <a:endParaRPr lang="en-US"/>
           </a:p>
@@ -1815,7 +1815,7 @@
           <a:p>
             <a:fld id="{1A30122B-BC72-41F7-938E-33D4221D7AF9}" type="datetimeFigureOut">
               <a:rPr lang="en-US" smtClean="0"/>
-              <a:t>6/16/2025</a:t>
+              <a:t>6/20/25</a:t>
             </a:fld>
             <a:endParaRPr lang="en-US"/>
           </a:p>
@@ -1956,7 +1956,7 @@
           <a:p>
             <a:fld id="{1A30122B-BC72-41F7-938E-33D4221D7AF9}" type="datetimeFigureOut">
               <a:rPr lang="en-US" smtClean="0"/>
-              <a:t>6/16/2025</a:t>
+              <a:t>6/20/25</a:t>
             </a:fld>
             <a:endParaRPr lang="en-US"/>
           </a:p>
@@ -2069,7 +2069,7 @@
           <a:p>
             <a:fld id="{1A30122B-BC72-41F7-938E-33D4221D7AF9}" type="datetimeFigureOut">
               <a:rPr lang="en-US" smtClean="0"/>
-              <a:t>6/16/2025</a:t>
+              <a:t>6/20/25</a:t>
             </a:fld>
             <a:endParaRPr lang="en-US"/>
           </a:p>
@@ -2380,7 +2380,7 @@
           <a:p>
             <a:fld id="{1A30122B-BC72-41F7-938E-33D4221D7AF9}" type="datetimeFigureOut">
               <a:rPr lang="en-US" smtClean="0"/>
-              <a:t>6/16/2025</a:t>
+              <a:t>6/20/25</a:t>
             </a:fld>
             <a:endParaRPr lang="en-US"/>
           </a:p>
@@ -2668,7 +2668,7 @@
           <a:p>
             <a:fld id="{1A30122B-BC72-41F7-938E-33D4221D7AF9}" type="datetimeFigureOut">
               <a:rPr lang="en-US" smtClean="0"/>
-              <a:t>6/16/2025</a:t>
+              <a:t>6/20/25</a:t>
             </a:fld>
             <a:endParaRPr lang="en-US"/>
           </a:p>
@@ -2909,7 +2909,7 @@
           <a:p>
             <a:fld id="{1A30122B-BC72-41F7-938E-33D4221D7AF9}" type="datetimeFigureOut">
               <a:rPr lang="en-US" smtClean="0"/>
-              <a:t>6/16/2025</a:t>
+              <a:t>6/20/25</a:t>
             </a:fld>
             <a:endParaRPr lang="en-US"/>
           </a:p>
@@ -4470,7 +4470,7 @@
         </p:nvSpPr>
         <p:spPr>
           <a:xfrm>
-            <a:off x="6013049" y="2377799"/>
+            <a:off x="6013049" y="2650190"/>
             <a:ext cx="2268570" cy="430887"/>
           </a:xfrm>
           <a:prstGeom prst="rect">

</xml_diff>